<commit_message>
Pitch Slides: Content (no styles)
</commit_message>
<xml_diff>
--- a/Trabalho/Parte1_Pitch/Pitch__Fuga_dos_Pets__Felipe_Freitas_Silva.pptx
+++ b/Trabalho/Parte1_Pitch/Pitch__Fuga_dos_Pets__Felipe_Freitas_Silva.pptx
@@ -6,6 +6,25 @@
   </p:sldMasterIdLst>
   <p:sldIdLst>
     <p:sldId id="257" r:id="rId2"/>
+    <p:sldId id="272" r:id="rId3"/>
+    <p:sldId id="273" r:id="rId4"/>
+    <p:sldId id="261" r:id="rId5"/>
+    <p:sldId id="262" r:id="rId6"/>
+    <p:sldId id="263" r:id="rId7"/>
+    <p:sldId id="264" r:id="rId8"/>
+    <p:sldId id="265" r:id="rId9"/>
+    <p:sldId id="266" r:id="rId10"/>
+    <p:sldId id="267" r:id="rId11"/>
+    <p:sldId id="268" r:id="rId12"/>
+    <p:sldId id="269" r:id="rId13"/>
+    <p:sldId id="260" r:id="rId14"/>
+    <p:sldId id="270" r:id="rId15"/>
+    <p:sldId id="271" r:id="rId16"/>
+    <p:sldId id="274" r:id="rId17"/>
+    <p:sldId id="277" r:id="rId18"/>
+    <p:sldId id="275" r:id="rId19"/>
+    <p:sldId id="276" r:id="rId20"/>
+    <p:sldId id="278" r:id="rId21"/>
   </p:sldIdLst>
   <p:sldSz cx="12192000" cy="6858000"/>
   <p:notesSz cx="6858000" cy="9144000"/>
@@ -104,6 +123,11 @@
       </a:defRPr>
     </a:lvl9pPr>
   </p:defaultTextStyle>
+  <p:extLst>
+    <p:ext uri="{EFAFB233-063F-42B5-8137-9DF3F51BA10A}">
+      <p15:sldGuideLst xmlns:p15="http://schemas.microsoft.com/office/powerpoint/2012/main"/>
+    </p:ext>
+  </p:extLst>
 </p:presentation>
 </file>
 
@@ -254,7 +278,7 @@
           <a:p>
             <a:fld id="{A3CD875E-28A7-4B82-859B-1A6079573ECF}" type="datetimeFigureOut">
               <a:rPr lang="en-US" smtClean="0"/>
-              <a:t>3/22/2024</a:t>
+              <a:t>3/23/2024</a:t>
             </a:fld>
             <a:endParaRPr lang="en-US"/>
           </a:p>
@@ -452,7 +476,7 @@
           <a:p>
             <a:fld id="{A3CD875E-28A7-4B82-859B-1A6079573ECF}" type="datetimeFigureOut">
               <a:rPr lang="en-US" smtClean="0"/>
-              <a:t>3/22/2024</a:t>
+              <a:t>3/23/2024</a:t>
             </a:fld>
             <a:endParaRPr lang="en-US"/>
           </a:p>
@@ -660,7 +684,7 @@
           <a:p>
             <a:fld id="{A3CD875E-28A7-4B82-859B-1A6079573ECF}" type="datetimeFigureOut">
               <a:rPr lang="en-US" smtClean="0"/>
-              <a:t>3/22/2024</a:t>
+              <a:t>3/23/2024</a:t>
             </a:fld>
             <a:endParaRPr lang="en-US"/>
           </a:p>
@@ -858,7 +882,7 @@
           <a:p>
             <a:fld id="{A3CD875E-28A7-4B82-859B-1A6079573ECF}" type="datetimeFigureOut">
               <a:rPr lang="en-US" smtClean="0"/>
-              <a:t>3/22/2024</a:t>
+              <a:t>3/23/2024</a:t>
             </a:fld>
             <a:endParaRPr lang="en-US"/>
           </a:p>
@@ -1133,7 +1157,7 @@
           <a:p>
             <a:fld id="{A3CD875E-28A7-4B82-859B-1A6079573ECF}" type="datetimeFigureOut">
               <a:rPr lang="en-US" smtClean="0"/>
-              <a:t>3/22/2024</a:t>
+              <a:t>3/23/2024</a:t>
             </a:fld>
             <a:endParaRPr lang="en-US"/>
           </a:p>
@@ -1398,7 +1422,7 @@
           <a:p>
             <a:fld id="{A3CD875E-28A7-4B82-859B-1A6079573ECF}" type="datetimeFigureOut">
               <a:rPr lang="en-US" smtClean="0"/>
-              <a:t>3/22/2024</a:t>
+              <a:t>3/23/2024</a:t>
             </a:fld>
             <a:endParaRPr lang="en-US"/>
           </a:p>
@@ -1810,7 +1834,7 @@
           <a:p>
             <a:fld id="{A3CD875E-28A7-4B82-859B-1A6079573ECF}" type="datetimeFigureOut">
               <a:rPr lang="en-US" smtClean="0"/>
-              <a:t>3/22/2024</a:t>
+              <a:t>3/23/2024</a:t>
             </a:fld>
             <a:endParaRPr lang="en-US"/>
           </a:p>
@@ -1951,7 +1975,7 @@
           <a:p>
             <a:fld id="{A3CD875E-28A7-4B82-859B-1A6079573ECF}" type="datetimeFigureOut">
               <a:rPr lang="en-US" smtClean="0"/>
-              <a:t>3/22/2024</a:t>
+              <a:t>3/23/2024</a:t>
             </a:fld>
             <a:endParaRPr lang="en-US"/>
           </a:p>
@@ -2064,7 +2088,7 @@
           <a:p>
             <a:fld id="{A3CD875E-28A7-4B82-859B-1A6079573ECF}" type="datetimeFigureOut">
               <a:rPr lang="en-US" smtClean="0"/>
-              <a:t>3/22/2024</a:t>
+              <a:t>3/23/2024</a:t>
             </a:fld>
             <a:endParaRPr lang="en-US"/>
           </a:p>
@@ -2375,7 +2399,7 @@
           <a:p>
             <a:fld id="{A3CD875E-28A7-4B82-859B-1A6079573ECF}" type="datetimeFigureOut">
               <a:rPr lang="en-US" smtClean="0"/>
-              <a:t>3/22/2024</a:t>
+              <a:t>3/23/2024</a:t>
             </a:fld>
             <a:endParaRPr lang="en-US"/>
           </a:p>
@@ -2663,7 +2687,7 @@
           <a:p>
             <a:fld id="{A3CD875E-28A7-4B82-859B-1A6079573ECF}" type="datetimeFigureOut">
               <a:rPr lang="en-US" smtClean="0"/>
-              <a:t>3/22/2024</a:t>
+              <a:t>3/23/2024</a:t>
             </a:fld>
             <a:endParaRPr lang="en-US"/>
           </a:p>
@@ -2904,7 +2928,7 @@
           <a:p>
             <a:fld id="{A3CD875E-28A7-4B82-859B-1A6079573ECF}" type="datetimeFigureOut">
               <a:rPr lang="en-US" smtClean="0"/>
-              <a:t>3/22/2024</a:t>
+              <a:t>3/23/2024</a:t>
             </a:fld>
             <a:endParaRPr lang="en-US"/>
           </a:p>
@@ -4985,6 +5009,2322 @@
 </p:sld>
 </file>
 
+<file path=ppt/slides/slide10.xml><?xml version="1.0" encoding="utf-8"?>
+<p:sld xmlns:a="http://schemas.openxmlformats.org/drawingml/2006/main" xmlns:r="http://schemas.openxmlformats.org/officeDocument/2006/relationships" xmlns:p="http://schemas.openxmlformats.org/presentationml/2006/main">
+  <p:cSld>
+    <p:spTree>
+      <p:nvGrpSpPr>
+        <p:cNvPr id="1" name=""/>
+        <p:cNvGrpSpPr/>
+        <p:nvPr/>
+      </p:nvGrpSpPr>
+      <p:grpSpPr>
+        <a:xfrm>
+          <a:off x="0" y="0"/>
+          <a:ext cx="0" cy="0"/>
+          <a:chOff x="0" y="0"/>
+          <a:chExt cx="0" cy="0"/>
+        </a:xfrm>
+      </p:grpSpPr>
+      <p:sp>
+        <p:nvSpPr>
+          <p:cNvPr id="2" name="Title 1">
+            <a:extLst>
+              <a:ext uri="{FF2B5EF4-FFF2-40B4-BE49-F238E27FC236}">
+                <a16:creationId xmlns:a16="http://schemas.microsoft.com/office/drawing/2014/main" id="{91ADED5D-B329-2A00-4BD6-1DE8B222045C}"/>
+              </a:ext>
+            </a:extLst>
+          </p:cNvPr>
+          <p:cNvSpPr>
+            <a:spLocks noGrp="1"/>
+          </p:cNvSpPr>
+          <p:nvPr>
+            <p:ph type="title"/>
+          </p:nvPr>
+        </p:nvSpPr>
+        <p:spPr/>
+        <p:txBody>
+          <a:bodyPr/>
+          <a:lstStyle/>
+          <a:p>
+            <a:r>
+              <a:rPr lang="en-US" dirty="0" err="1"/>
+              <a:t>Mecânicas</a:t>
+            </a:r>
+            <a:r>
+              <a:rPr lang="en-US" dirty="0"/>
+              <a:t> </a:t>
+            </a:r>
+            <a:r>
+              <a:rPr lang="en-US" dirty="0" err="1"/>
+              <a:t>Secundárias</a:t>
+            </a:r>
+            <a:r>
+              <a:rPr lang="en-US" dirty="0"/>
+              <a:t> - </a:t>
+            </a:r>
+            <a:r>
+              <a:rPr lang="en-US" dirty="0" err="1"/>
+              <a:t>Cebolinha</a:t>
+            </a:r>
+            <a:endParaRPr lang="en-US" dirty="0"/>
+          </a:p>
+        </p:txBody>
+      </p:sp>
+      <p:sp>
+        <p:nvSpPr>
+          <p:cNvPr id="3" name="Content Placeholder 2">
+            <a:extLst>
+              <a:ext uri="{FF2B5EF4-FFF2-40B4-BE49-F238E27FC236}">
+                <a16:creationId xmlns:a16="http://schemas.microsoft.com/office/drawing/2014/main" id="{532DA5D7-10BD-DEC7-9AFC-430800089859}"/>
+              </a:ext>
+            </a:extLst>
+          </p:cNvPr>
+          <p:cNvSpPr>
+            <a:spLocks noGrp="1"/>
+          </p:cNvSpPr>
+          <p:nvPr>
+            <p:ph idx="1"/>
+          </p:nvPr>
+        </p:nvSpPr>
+        <p:spPr/>
+        <p:txBody>
+          <a:bodyPr/>
+          <a:lstStyle/>
+          <a:p>
+            <a:pPr marL="0" indent="0">
+              <a:buNone/>
+            </a:pPr>
+            <a:r>
+              <a:rPr lang="en-US" dirty="0" err="1"/>
+              <a:t>Coletar</a:t>
+            </a:r>
+            <a:r>
+              <a:rPr lang="en-US" dirty="0"/>
+              <a:t> </a:t>
+            </a:r>
+            <a:r>
+              <a:rPr lang="en-US" dirty="0" err="1"/>
+              <a:t>itens</a:t>
+            </a:r>
+            <a:r>
+              <a:rPr lang="en-US" dirty="0"/>
+              <a:t> </a:t>
+            </a:r>
+            <a:r>
+              <a:rPr lang="en-US" dirty="0" err="1"/>
+              <a:t>distantes</a:t>
+            </a:r>
+            <a:endParaRPr lang="en-US" dirty="0"/>
+          </a:p>
+          <a:p>
+            <a:pPr marL="0" indent="0">
+              <a:buNone/>
+            </a:pPr>
+            <a:r>
+              <a:rPr lang="en-US" dirty="0" err="1"/>
+              <a:t>Ativar</a:t>
+            </a:r>
+            <a:r>
+              <a:rPr lang="en-US" dirty="0"/>
+              <a:t> </a:t>
+            </a:r>
+            <a:r>
+              <a:rPr lang="en-US" dirty="0" err="1"/>
+              <a:t>alavancas</a:t>
+            </a:r>
+            <a:r>
+              <a:rPr lang="en-US" dirty="0"/>
+              <a:t> </a:t>
+            </a:r>
+            <a:r>
+              <a:rPr lang="en-US" dirty="0" err="1"/>
+              <a:t>acima</a:t>
+            </a:r>
+            <a:endParaRPr lang="en-US" dirty="0"/>
+          </a:p>
+          <a:p>
+            <a:pPr marL="0" indent="0">
+              <a:buNone/>
+            </a:pPr>
+            <a:r>
+              <a:rPr lang="en-US" dirty="0" err="1"/>
+              <a:t>Levantar</a:t>
+            </a:r>
+            <a:r>
+              <a:rPr lang="en-US" dirty="0"/>
+              <a:t> </a:t>
+            </a:r>
+            <a:r>
+              <a:rPr lang="en-US" dirty="0" err="1"/>
+              <a:t>plataformas</a:t>
+            </a:r>
+            <a:endParaRPr lang="en-US" dirty="0"/>
+          </a:p>
+        </p:txBody>
+      </p:sp>
+    </p:spTree>
+    <p:extLst>
+      <p:ext uri="{BB962C8B-B14F-4D97-AF65-F5344CB8AC3E}">
+        <p14:creationId xmlns:p14="http://schemas.microsoft.com/office/powerpoint/2010/main" val="13887473"/>
+      </p:ext>
+    </p:extLst>
+  </p:cSld>
+  <p:clrMapOvr>
+    <a:masterClrMapping/>
+  </p:clrMapOvr>
+</p:sld>
+</file>
+
+<file path=ppt/slides/slide11.xml><?xml version="1.0" encoding="utf-8"?>
+<p:sld xmlns:a="http://schemas.openxmlformats.org/drawingml/2006/main" xmlns:r="http://schemas.openxmlformats.org/officeDocument/2006/relationships" xmlns:p="http://schemas.openxmlformats.org/presentationml/2006/main">
+  <p:cSld>
+    <p:spTree>
+      <p:nvGrpSpPr>
+        <p:cNvPr id="1" name=""/>
+        <p:cNvGrpSpPr/>
+        <p:nvPr/>
+      </p:nvGrpSpPr>
+      <p:grpSpPr>
+        <a:xfrm>
+          <a:off x="0" y="0"/>
+          <a:ext cx="0" cy="0"/>
+          <a:chOff x="0" y="0"/>
+          <a:chExt cx="0" cy="0"/>
+        </a:xfrm>
+      </p:grpSpPr>
+      <p:sp>
+        <p:nvSpPr>
+          <p:cNvPr id="2" name="Title 1">
+            <a:extLst>
+              <a:ext uri="{FF2B5EF4-FFF2-40B4-BE49-F238E27FC236}">
+                <a16:creationId xmlns:a16="http://schemas.microsoft.com/office/drawing/2014/main" id="{91ADED5D-B329-2A00-4BD6-1DE8B222045C}"/>
+              </a:ext>
+            </a:extLst>
+          </p:cNvPr>
+          <p:cNvSpPr>
+            <a:spLocks noGrp="1"/>
+          </p:cNvSpPr>
+          <p:nvPr>
+            <p:ph type="title"/>
+          </p:nvPr>
+        </p:nvSpPr>
+        <p:spPr/>
+        <p:txBody>
+          <a:bodyPr/>
+          <a:lstStyle/>
+          <a:p>
+            <a:r>
+              <a:rPr lang="en-US" dirty="0" err="1"/>
+              <a:t>Mecânicas</a:t>
+            </a:r>
+            <a:r>
+              <a:rPr lang="en-US" dirty="0"/>
+              <a:t> </a:t>
+            </a:r>
+            <a:r>
+              <a:rPr lang="en-US" dirty="0" err="1"/>
+              <a:t>Secundárias</a:t>
+            </a:r>
+            <a:r>
+              <a:rPr lang="en-US" dirty="0"/>
+              <a:t> - </a:t>
+            </a:r>
+            <a:r>
+              <a:rPr lang="en-US" dirty="0" err="1"/>
+              <a:t>Cascão</a:t>
+            </a:r>
+            <a:endParaRPr lang="en-US" dirty="0"/>
+          </a:p>
+        </p:txBody>
+      </p:sp>
+      <p:sp>
+        <p:nvSpPr>
+          <p:cNvPr id="3" name="Content Placeholder 2">
+            <a:extLst>
+              <a:ext uri="{FF2B5EF4-FFF2-40B4-BE49-F238E27FC236}">
+                <a16:creationId xmlns:a16="http://schemas.microsoft.com/office/drawing/2014/main" id="{532DA5D7-10BD-DEC7-9AFC-430800089859}"/>
+              </a:ext>
+            </a:extLst>
+          </p:cNvPr>
+          <p:cNvSpPr>
+            <a:spLocks noGrp="1"/>
+          </p:cNvSpPr>
+          <p:nvPr>
+            <p:ph idx="1"/>
+          </p:nvPr>
+        </p:nvSpPr>
+        <p:spPr/>
+        <p:txBody>
+          <a:bodyPr/>
+          <a:lstStyle/>
+          <a:p>
+            <a:pPr marL="0" indent="0">
+              <a:buNone/>
+            </a:pPr>
+            <a:r>
+              <a:rPr lang="en-US" dirty="0" err="1"/>
+              <a:t>Coletar</a:t>
+            </a:r>
+            <a:r>
+              <a:rPr lang="en-US" dirty="0"/>
+              <a:t> </a:t>
+            </a:r>
+            <a:r>
+              <a:rPr lang="en-US" dirty="0" err="1"/>
+              <a:t>itens</a:t>
+            </a:r>
+            <a:r>
+              <a:rPr lang="en-US" dirty="0"/>
+              <a:t> </a:t>
+            </a:r>
+            <a:r>
+              <a:rPr lang="en-US" dirty="0" err="1"/>
+              <a:t>distantes</a:t>
+            </a:r>
+            <a:endParaRPr lang="en-US" dirty="0"/>
+          </a:p>
+          <a:p>
+            <a:pPr marL="0" indent="0">
+              <a:buNone/>
+            </a:pPr>
+            <a:r>
+              <a:rPr lang="en-US" dirty="0"/>
+              <a:t>Usar </a:t>
+            </a:r>
+            <a:r>
+              <a:rPr lang="en-US" dirty="0" err="1"/>
+              <a:t>guarda</a:t>
+            </a:r>
+            <a:r>
+              <a:rPr lang="en-US" dirty="0"/>
+              <a:t>-chuva </a:t>
+            </a:r>
+            <a:r>
+              <a:rPr lang="en-US" dirty="0" err="1"/>
+              <a:t>como</a:t>
+            </a:r>
+            <a:r>
+              <a:rPr lang="en-US" dirty="0"/>
+              <a:t> </a:t>
+            </a:r>
+            <a:r>
+              <a:rPr lang="en-US" dirty="0" err="1"/>
+              <a:t>trava</a:t>
+            </a:r>
+            <a:r>
+              <a:rPr lang="en-US" dirty="0"/>
+              <a:t> para </a:t>
+            </a:r>
+            <a:r>
+              <a:rPr lang="en-US" dirty="0" err="1"/>
+              <a:t>alavanca</a:t>
+            </a:r>
+            <a:r>
+              <a:rPr lang="en-US" dirty="0"/>
+              <a:t> com </a:t>
+            </a:r>
+            <a:r>
+              <a:rPr lang="en-US" dirty="0" err="1"/>
+              <a:t>limite</a:t>
+            </a:r>
+            <a:r>
+              <a:rPr lang="en-US" dirty="0"/>
+              <a:t> de tempo</a:t>
+            </a:r>
+          </a:p>
+        </p:txBody>
+      </p:sp>
+    </p:spTree>
+    <p:extLst>
+      <p:ext uri="{BB962C8B-B14F-4D97-AF65-F5344CB8AC3E}">
+        <p14:creationId xmlns:p14="http://schemas.microsoft.com/office/powerpoint/2010/main" val="2805816239"/>
+      </p:ext>
+    </p:extLst>
+  </p:cSld>
+  <p:clrMapOvr>
+    <a:masterClrMapping/>
+  </p:clrMapOvr>
+</p:sld>
+</file>
+
+<file path=ppt/slides/slide12.xml><?xml version="1.0" encoding="utf-8"?>
+<p:sld xmlns:a="http://schemas.openxmlformats.org/drawingml/2006/main" xmlns:r="http://schemas.openxmlformats.org/officeDocument/2006/relationships" xmlns:p="http://schemas.openxmlformats.org/presentationml/2006/main">
+  <p:cSld>
+    <p:spTree>
+      <p:nvGrpSpPr>
+        <p:cNvPr id="1" name=""/>
+        <p:cNvGrpSpPr/>
+        <p:nvPr/>
+      </p:nvGrpSpPr>
+      <p:grpSpPr>
+        <a:xfrm>
+          <a:off x="0" y="0"/>
+          <a:ext cx="0" cy="0"/>
+          <a:chOff x="0" y="0"/>
+          <a:chExt cx="0" cy="0"/>
+        </a:xfrm>
+      </p:grpSpPr>
+      <p:sp>
+        <p:nvSpPr>
+          <p:cNvPr id="2" name="Title 1">
+            <a:extLst>
+              <a:ext uri="{FF2B5EF4-FFF2-40B4-BE49-F238E27FC236}">
+                <a16:creationId xmlns:a16="http://schemas.microsoft.com/office/drawing/2014/main" id="{91ADED5D-B329-2A00-4BD6-1DE8B222045C}"/>
+              </a:ext>
+            </a:extLst>
+          </p:cNvPr>
+          <p:cNvSpPr>
+            <a:spLocks noGrp="1"/>
+          </p:cNvSpPr>
+          <p:nvPr>
+            <p:ph type="title"/>
+          </p:nvPr>
+        </p:nvSpPr>
+        <p:spPr/>
+        <p:txBody>
+          <a:bodyPr/>
+          <a:lstStyle/>
+          <a:p>
+            <a:r>
+              <a:rPr lang="en-US" dirty="0" err="1"/>
+              <a:t>Mecânicas</a:t>
+            </a:r>
+            <a:r>
+              <a:rPr lang="en-US" dirty="0"/>
+              <a:t> </a:t>
+            </a:r>
+            <a:r>
+              <a:rPr lang="en-US" dirty="0" err="1"/>
+              <a:t>Secundárias</a:t>
+            </a:r>
+            <a:r>
+              <a:rPr lang="en-US" dirty="0"/>
+              <a:t> - Magali</a:t>
+            </a:r>
+          </a:p>
+        </p:txBody>
+      </p:sp>
+      <p:sp>
+        <p:nvSpPr>
+          <p:cNvPr id="3" name="Content Placeholder 2">
+            <a:extLst>
+              <a:ext uri="{FF2B5EF4-FFF2-40B4-BE49-F238E27FC236}">
+                <a16:creationId xmlns:a16="http://schemas.microsoft.com/office/drawing/2014/main" id="{532DA5D7-10BD-DEC7-9AFC-430800089859}"/>
+              </a:ext>
+            </a:extLst>
+          </p:cNvPr>
+          <p:cNvSpPr>
+            <a:spLocks noGrp="1"/>
+          </p:cNvSpPr>
+          <p:nvPr>
+            <p:ph idx="1"/>
+          </p:nvPr>
+        </p:nvSpPr>
+        <p:spPr/>
+        <p:txBody>
+          <a:bodyPr/>
+          <a:lstStyle/>
+          <a:p>
+            <a:pPr marL="0" indent="0">
+              <a:buNone/>
+            </a:pPr>
+            <a:r>
+              <a:rPr lang="en-US" dirty="0" err="1"/>
+              <a:t>Coletar</a:t>
+            </a:r>
+            <a:r>
+              <a:rPr lang="en-US" dirty="0"/>
+              <a:t> </a:t>
+            </a:r>
+            <a:r>
+              <a:rPr lang="en-US" dirty="0" err="1"/>
+              <a:t>itens</a:t>
+            </a:r>
+            <a:r>
+              <a:rPr lang="en-US" dirty="0"/>
+              <a:t> </a:t>
+            </a:r>
+            <a:r>
+              <a:rPr lang="en-US" dirty="0" err="1"/>
+              <a:t>distantes</a:t>
+            </a:r>
+            <a:endParaRPr lang="en-US" dirty="0"/>
+          </a:p>
+          <a:p>
+            <a:pPr marL="0" indent="0">
+              <a:buNone/>
+            </a:pPr>
+            <a:r>
+              <a:rPr lang="en-US" dirty="0" err="1"/>
+              <a:t>Ativar</a:t>
+            </a:r>
+            <a:r>
+              <a:rPr lang="en-US" dirty="0"/>
+              <a:t> </a:t>
+            </a:r>
+            <a:r>
+              <a:rPr lang="en-US" dirty="0" err="1"/>
+              <a:t>alavancas</a:t>
+            </a:r>
+            <a:r>
+              <a:rPr lang="en-US" dirty="0"/>
+              <a:t> a </a:t>
+            </a:r>
+            <a:r>
+              <a:rPr lang="en-US" dirty="0" err="1"/>
+              <a:t>distância</a:t>
+            </a:r>
+            <a:endParaRPr lang="en-US" dirty="0"/>
+          </a:p>
+        </p:txBody>
+      </p:sp>
+    </p:spTree>
+    <p:extLst>
+      <p:ext uri="{BB962C8B-B14F-4D97-AF65-F5344CB8AC3E}">
+        <p14:creationId xmlns:p14="http://schemas.microsoft.com/office/powerpoint/2010/main" val="4095169360"/>
+      </p:ext>
+    </p:extLst>
+  </p:cSld>
+  <p:clrMapOvr>
+    <a:masterClrMapping/>
+  </p:clrMapOvr>
+</p:sld>
+</file>
+
+<file path=ppt/slides/slide13.xml><?xml version="1.0" encoding="utf-8"?>
+<p:sld xmlns:a="http://schemas.openxmlformats.org/drawingml/2006/main" xmlns:r="http://schemas.openxmlformats.org/officeDocument/2006/relationships" xmlns:p="http://schemas.openxmlformats.org/presentationml/2006/main">
+  <p:cSld>
+    <p:spTree>
+      <p:nvGrpSpPr>
+        <p:cNvPr id="1" name=""/>
+        <p:cNvGrpSpPr/>
+        <p:nvPr/>
+      </p:nvGrpSpPr>
+      <p:grpSpPr>
+        <a:xfrm>
+          <a:off x="0" y="0"/>
+          <a:ext cx="0" cy="0"/>
+          <a:chOff x="0" y="0"/>
+          <a:chExt cx="0" cy="0"/>
+        </a:xfrm>
+      </p:grpSpPr>
+      <p:sp>
+        <p:nvSpPr>
+          <p:cNvPr id="2" name="Title 1">
+            <a:extLst>
+              <a:ext uri="{FF2B5EF4-FFF2-40B4-BE49-F238E27FC236}">
+                <a16:creationId xmlns:a16="http://schemas.microsoft.com/office/drawing/2014/main" id="{6107F1B5-BA06-1A5E-6364-3499097B7DC2}"/>
+              </a:ext>
+            </a:extLst>
+          </p:cNvPr>
+          <p:cNvSpPr>
+            <a:spLocks noGrp="1"/>
+          </p:cNvSpPr>
+          <p:nvPr>
+            <p:ph type="title"/>
+          </p:nvPr>
+        </p:nvSpPr>
+        <p:spPr/>
+        <p:txBody>
+          <a:bodyPr/>
+          <a:lstStyle/>
+          <a:p>
+            <a:r>
+              <a:rPr lang="en-US" dirty="0" err="1"/>
+              <a:t>Inspirações</a:t>
+            </a:r>
+            <a:endParaRPr lang="en-US" dirty="0"/>
+          </a:p>
+        </p:txBody>
+      </p:sp>
+      <p:sp>
+        <p:nvSpPr>
+          <p:cNvPr id="3" name="Content Placeholder 2">
+            <a:extLst>
+              <a:ext uri="{FF2B5EF4-FFF2-40B4-BE49-F238E27FC236}">
+                <a16:creationId xmlns:a16="http://schemas.microsoft.com/office/drawing/2014/main" id="{F917C81D-FCC8-6BF5-E526-F27C32187DCB}"/>
+              </a:ext>
+            </a:extLst>
+          </p:cNvPr>
+          <p:cNvSpPr>
+            <a:spLocks noGrp="1"/>
+          </p:cNvSpPr>
+          <p:nvPr>
+            <p:ph idx="1"/>
+          </p:nvPr>
+        </p:nvSpPr>
+        <p:spPr/>
+        <p:txBody>
+          <a:bodyPr/>
+          <a:lstStyle/>
+          <a:p>
+            <a:r>
+              <a:rPr lang="en-US" dirty="0"/>
+              <a:t>Ben 10: Savage Pursuit</a:t>
+            </a:r>
+          </a:p>
+          <a:p>
+            <a:r>
+              <a:rPr lang="en-US" dirty="0"/>
+              <a:t>A </a:t>
+            </a:r>
+            <a:r>
+              <a:rPr lang="en-US" dirty="0" err="1"/>
+              <a:t>Lenda</a:t>
+            </a:r>
+            <a:r>
+              <a:rPr lang="en-US" dirty="0"/>
+              <a:t> do </a:t>
+            </a:r>
+            <a:r>
+              <a:rPr lang="en-US" dirty="0" err="1"/>
+              <a:t>Herói</a:t>
+            </a:r>
+            <a:endParaRPr lang="en-US" dirty="0"/>
+          </a:p>
+        </p:txBody>
+      </p:sp>
+    </p:spTree>
+    <p:extLst>
+      <p:ext uri="{BB962C8B-B14F-4D97-AF65-F5344CB8AC3E}">
+        <p14:creationId xmlns:p14="http://schemas.microsoft.com/office/powerpoint/2010/main" val="464006194"/>
+      </p:ext>
+    </p:extLst>
+  </p:cSld>
+  <p:clrMapOvr>
+    <a:masterClrMapping/>
+  </p:clrMapOvr>
+</p:sld>
+</file>
+
+<file path=ppt/slides/slide14.xml><?xml version="1.0" encoding="utf-8"?>
+<p:sld xmlns:a="http://schemas.openxmlformats.org/drawingml/2006/main" xmlns:r="http://schemas.openxmlformats.org/officeDocument/2006/relationships" xmlns:p="http://schemas.openxmlformats.org/presentationml/2006/main">
+  <p:cSld>
+    <p:spTree>
+      <p:nvGrpSpPr>
+        <p:cNvPr id="1" name=""/>
+        <p:cNvGrpSpPr/>
+        <p:nvPr/>
+      </p:nvGrpSpPr>
+      <p:grpSpPr>
+        <a:xfrm>
+          <a:off x="0" y="0"/>
+          <a:ext cx="0" cy="0"/>
+          <a:chOff x="0" y="0"/>
+          <a:chExt cx="0" cy="0"/>
+        </a:xfrm>
+      </p:grpSpPr>
+      <p:sp>
+        <p:nvSpPr>
+          <p:cNvPr id="2" name="Title 1">
+            <a:extLst>
+              <a:ext uri="{FF2B5EF4-FFF2-40B4-BE49-F238E27FC236}">
+                <a16:creationId xmlns:a16="http://schemas.microsoft.com/office/drawing/2014/main" id="{91ADED5D-B329-2A00-4BD6-1DE8B222045C}"/>
+              </a:ext>
+            </a:extLst>
+          </p:cNvPr>
+          <p:cNvSpPr>
+            <a:spLocks noGrp="1"/>
+          </p:cNvSpPr>
+          <p:nvPr>
+            <p:ph type="title"/>
+          </p:nvPr>
+        </p:nvSpPr>
+        <p:spPr/>
+        <p:txBody>
+          <a:bodyPr/>
+          <a:lstStyle/>
+          <a:p>
+            <a:r>
+              <a:rPr lang="en-US" dirty="0" err="1"/>
+              <a:t>Progressão</a:t>
+            </a:r>
+            <a:endParaRPr lang="en-US" dirty="0"/>
+          </a:p>
+        </p:txBody>
+      </p:sp>
+      <p:sp>
+        <p:nvSpPr>
+          <p:cNvPr id="3" name="Content Placeholder 2">
+            <a:extLst>
+              <a:ext uri="{FF2B5EF4-FFF2-40B4-BE49-F238E27FC236}">
+                <a16:creationId xmlns:a16="http://schemas.microsoft.com/office/drawing/2014/main" id="{532DA5D7-10BD-DEC7-9AFC-430800089859}"/>
+              </a:ext>
+            </a:extLst>
+          </p:cNvPr>
+          <p:cNvSpPr>
+            <a:spLocks noGrp="1"/>
+          </p:cNvSpPr>
+          <p:nvPr>
+            <p:ph idx="1"/>
+          </p:nvPr>
+        </p:nvSpPr>
+        <p:spPr/>
+        <p:txBody>
+          <a:bodyPr/>
+          <a:lstStyle/>
+          <a:p>
+            <a:r>
+              <a:rPr lang="en-US" dirty="0" err="1"/>
+              <a:t>Coletar</a:t>
+            </a:r>
+            <a:r>
+              <a:rPr lang="en-US" dirty="0"/>
+              <a:t> </a:t>
+            </a:r>
+            <a:r>
+              <a:rPr lang="en-US" dirty="0" err="1"/>
+              <a:t>itens</a:t>
+            </a:r>
+            <a:r>
+              <a:rPr lang="en-US" dirty="0"/>
+              <a:t> </a:t>
+            </a:r>
+            <a:r>
+              <a:rPr lang="en-US" dirty="0" err="1"/>
+              <a:t>diversos</a:t>
+            </a:r>
+            <a:endParaRPr lang="en-US" dirty="0"/>
+          </a:p>
+          <a:p>
+            <a:pPr lvl="1"/>
+            <a:r>
+              <a:rPr lang="en-US" dirty="0"/>
+              <a:t>Trivia sobre </a:t>
+            </a:r>
+            <a:r>
+              <a:rPr lang="en-US" dirty="0" err="1"/>
+              <a:t>personagens</a:t>
+            </a:r>
+            <a:endParaRPr lang="en-US" dirty="0"/>
+          </a:p>
+          <a:p>
+            <a:r>
+              <a:rPr lang="en-US" dirty="0" err="1"/>
+              <a:t>Encontrar</a:t>
+            </a:r>
+            <a:r>
+              <a:rPr lang="en-US" dirty="0"/>
+              <a:t> pets</a:t>
+            </a:r>
+          </a:p>
+        </p:txBody>
+      </p:sp>
+    </p:spTree>
+    <p:extLst>
+      <p:ext uri="{BB962C8B-B14F-4D97-AF65-F5344CB8AC3E}">
+        <p14:creationId xmlns:p14="http://schemas.microsoft.com/office/powerpoint/2010/main" val="1838863473"/>
+      </p:ext>
+    </p:extLst>
+  </p:cSld>
+  <p:clrMapOvr>
+    <a:masterClrMapping/>
+  </p:clrMapOvr>
+</p:sld>
+</file>
+
+<file path=ppt/slides/slide15.xml><?xml version="1.0" encoding="utf-8"?>
+<p:sld xmlns:a="http://schemas.openxmlformats.org/drawingml/2006/main" xmlns:r="http://schemas.openxmlformats.org/officeDocument/2006/relationships" xmlns:p="http://schemas.openxmlformats.org/presentationml/2006/main">
+  <p:cSld>
+    <p:spTree>
+      <p:nvGrpSpPr>
+        <p:cNvPr id="1" name=""/>
+        <p:cNvGrpSpPr/>
+        <p:nvPr/>
+      </p:nvGrpSpPr>
+      <p:grpSpPr>
+        <a:xfrm>
+          <a:off x="0" y="0"/>
+          <a:ext cx="0" cy="0"/>
+          <a:chOff x="0" y="0"/>
+          <a:chExt cx="0" cy="0"/>
+        </a:xfrm>
+      </p:grpSpPr>
+      <p:sp>
+        <p:nvSpPr>
+          <p:cNvPr id="2" name="Title 1">
+            <a:extLst>
+              <a:ext uri="{FF2B5EF4-FFF2-40B4-BE49-F238E27FC236}">
+                <a16:creationId xmlns:a16="http://schemas.microsoft.com/office/drawing/2014/main" id="{91ADED5D-B329-2A00-4BD6-1DE8B222045C}"/>
+              </a:ext>
+            </a:extLst>
+          </p:cNvPr>
+          <p:cNvSpPr>
+            <a:spLocks noGrp="1"/>
+          </p:cNvSpPr>
+          <p:nvPr>
+            <p:ph type="title"/>
+          </p:nvPr>
+        </p:nvSpPr>
+        <p:spPr/>
+        <p:txBody>
+          <a:bodyPr/>
+          <a:lstStyle/>
+          <a:p>
+            <a:r>
+              <a:rPr lang="en-US" dirty="0" err="1"/>
+              <a:t>Objetivo</a:t>
+            </a:r>
+            <a:r>
+              <a:rPr lang="en-US" dirty="0"/>
+              <a:t> Final</a:t>
+            </a:r>
+          </a:p>
+        </p:txBody>
+      </p:sp>
+      <p:sp>
+        <p:nvSpPr>
+          <p:cNvPr id="3" name="Content Placeholder 2">
+            <a:extLst>
+              <a:ext uri="{FF2B5EF4-FFF2-40B4-BE49-F238E27FC236}">
+                <a16:creationId xmlns:a16="http://schemas.microsoft.com/office/drawing/2014/main" id="{532DA5D7-10BD-DEC7-9AFC-430800089859}"/>
+              </a:ext>
+            </a:extLst>
+          </p:cNvPr>
+          <p:cNvSpPr>
+            <a:spLocks noGrp="1"/>
+          </p:cNvSpPr>
+          <p:nvPr>
+            <p:ph idx="1"/>
+          </p:nvPr>
+        </p:nvSpPr>
+        <p:spPr/>
+        <p:txBody>
+          <a:bodyPr/>
+          <a:lstStyle/>
+          <a:p>
+            <a:pPr marL="0" indent="0">
+              <a:buNone/>
+            </a:pPr>
+            <a:r>
+              <a:rPr lang="en-US" dirty="0" err="1"/>
+              <a:t>Encontrar</a:t>
+            </a:r>
+            <a:r>
+              <a:rPr lang="en-US" dirty="0"/>
+              <a:t> todos </a:t>
+            </a:r>
+            <a:r>
+              <a:rPr lang="en-US" dirty="0" err="1"/>
+              <a:t>os</a:t>
+            </a:r>
+            <a:r>
+              <a:rPr lang="en-US" dirty="0"/>
+              <a:t> pets</a:t>
+            </a:r>
+          </a:p>
+        </p:txBody>
+      </p:sp>
+    </p:spTree>
+    <p:extLst>
+      <p:ext uri="{BB962C8B-B14F-4D97-AF65-F5344CB8AC3E}">
+        <p14:creationId xmlns:p14="http://schemas.microsoft.com/office/powerpoint/2010/main" val="583240303"/>
+      </p:ext>
+    </p:extLst>
+  </p:cSld>
+  <p:clrMapOvr>
+    <a:masterClrMapping/>
+  </p:clrMapOvr>
+</p:sld>
+</file>
+
+<file path=ppt/slides/slide16.xml><?xml version="1.0" encoding="utf-8"?>
+<p:sld xmlns:a="http://schemas.openxmlformats.org/drawingml/2006/main" xmlns:r="http://schemas.openxmlformats.org/officeDocument/2006/relationships" xmlns:p="http://schemas.openxmlformats.org/presentationml/2006/main">
+  <p:cSld>
+    <p:spTree>
+      <p:nvGrpSpPr>
+        <p:cNvPr id="1" name=""/>
+        <p:cNvGrpSpPr/>
+        <p:nvPr/>
+      </p:nvGrpSpPr>
+      <p:grpSpPr>
+        <a:xfrm>
+          <a:off x="0" y="0"/>
+          <a:ext cx="0" cy="0"/>
+          <a:chOff x="0" y="0"/>
+          <a:chExt cx="0" cy="0"/>
+        </a:xfrm>
+      </p:grpSpPr>
+      <p:sp>
+        <p:nvSpPr>
+          <p:cNvPr id="2" name="Title 1">
+            <a:extLst>
+              <a:ext uri="{FF2B5EF4-FFF2-40B4-BE49-F238E27FC236}">
+                <a16:creationId xmlns:a16="http://schemas.microsoft.com/office/drawing/2014/main" id="{2B44A735-BD2C-97B7-B416-FD9057F806EE}"/>
+              </a:ext>
+            </a:extLst>
+          </p:cNvPr>
+          <p:cNvSpPr>
+            <a:spLocks noGrp="1"/>
+          </p:cNvSpPr>
+          <p:nvPr>
+            <p:ph type="title"/>
+          </p:nvPr>
+        </p:nvSpPr>
+        <p:spPr/>
+        <p:txBody>
+          <a:bodyPr/>
+          <a:lstStyle/>
+          <a:p>
+            <a:r>
+              <a:rPr lang="en-US" dirty="0"/>
+              <a:t>Artes: </a:t>
+            </a:r>
+            <a:r>
+              <a:rPr lang="en-US" dirty="0" err="1"/>
+              <a:t>Personagens</a:t>
+            </a:r>
+            <a:endParaRPr lang="en-US" dirty="0"/>
+          </a:p>
+        </p:txBody>
+      </p:sp>
+      <p:sp>
+        <p:nvSpPr>
+          <p:cNvPr id="3" name="Content Placeholder 2">
+            <a:extLst>
+              <a:ext uri="{FF2B5EF4-FFF2-40B4-BE49-F238E27FC236}">
+                <a16:creationId xmlns:a16="http://schemas.microsoft.com/office/drawing/2014/main" id="{0153D864-4EBA-06EF-D6BE-B3BA4898D745}"/>
+              </a:ext>
+            </a:extLst>
+          </p:cNvPr>
+          <p:cNvSpPr>
+            <a:spLocks noGrp="1"/>
+          </p:cNvSpPr>
+          <p:nvPr>
+            <p:ph idx="1"/>
+          </p:nvPr>
+        </p:nvSpPr>
+        <p:spPr/>
+        <p:txBody>
+          <a:bodyPr/>
+          <a:lstStyle/>
+          <a:p>
+            <a:pPr marL="0" indent="0">
+              <a:buNone/>
+            </a:pPr>
+            <a:endParaRPr lang="en-US" dirty="0"/>
+          </a:p>
+        </p:txBody>
+      </p:sp>
+    </p:spTree>
+    <p:extLst>
+      <p:ext uri="{BB962C8B-B14F-4D97-AF65-F5344CB8AC3E}">
+        <p14:creationId xmlns:p14="http://schemas.microsoft.com/office/powerpoint/2010/main" val="2792011925"/>
+      </p:ext>
+    </p:extLst>
+  </p:cSld>
+  <p:clrMapOvr>
+    <a:masterClrMapping/>
+  </p:clrMapOvr>
+</p:sld>
+</file>
+
+<file path=ppt/slides/slide17.xml><?xml version="1.0" encoding="utf-8"?>
+<p:sld xmlns:a="http://schemas.openxmlformats.org/drawingml/2006/main" xmlns:r="http://schemas.openxmlformats.org/officeDocument/2006/relationships" xmlns:p="http://schemas.openxmlformats.org/presentationml/2006/main">
+  <p:cSld>
+    <p:spTree>
+      <p:nvGrpSpPr>
+        <p:cNvPr id="1" name=""/>
+        <p:cNvGrpSpPr/>
+        <p:nvPr/>
+      </p:nvGrpSpPr>
+      <p:grpSpPr>
+        <a:xfrm>
+          <a:off x="0" y="0"/>
+          <a:ext cx="0" cy="0"/>
+          <a:chOff x="0" y="0"/>
+          <a:chExt cx="0" cy="0"/>
+        </a:xfrm>
+      </p:grpSpPr>
+      <p:sp>
+        <p:nvSpPr>
+          <p:cNvPr id="2" name="Title 1">
+            <a:extLst>
+              <a:ext uri="{FF2B5EF4-FFF2-40B4-BE49-F238E27FC236}">
+                <a16:creationId xmlns:a16="http://schemas.microsoft.com/office/drawing/2014/main" id="{2B44A735-BD2C-97B7-B416-FD9057F806EE}"/>
+              </a:ext>
+            </a:extLst>
+          </p:cNvPr>
+          <p:cNvSpPr>
+            <a:spLocks noGrp="1"/>
+          </p:cNvSpPr>
+          <p:nvPr>
+            <p:ph type="title"/>
+          </p:nvPr>
+        </p:nvSpPr>
+        <p:spPr/>
+        <p:txBody>
+          <a:bodyPr/>
+          <a:lstStyle/>
+          <a:p>
+            <a:r>
+              <a:rPr lang="en-US" dirty="0"/>
+              <a:t>Artes: Pets</a:t>
+            </a:r>
+          </a:p>
+        </p:txBody>
+      </p:sp>
+      <p:sp>
+        <p:nvSpPr>
+          <p:cNvPr id="3" name="Content Placeholder 2">
+            <a:extLst>
+              <a:ext uri="{FF2B5EF4-FFF2-40B4-BE49-F238E27FC236}">
+                <a16:creationId xmlns:a16="http://schemas.microsoft.com/office/drawing/2014/main" id="{0153D864-4EBA-06EF-D6BE-B3BA4898D745}"/>
+              </a:ext>
+            </a:extLst>
+          </p:cNvPr>
+          <p:cNvSpPr>
+            <a:spLocks noGrp="1"/>
+          </p:cNvSpPr>
+          <p:nvPr>
+            <p:ph idx="1"/>
+          </p:nvPr>
+        </p:nvSpPr>
+        <p:spPr/>
+        <p:txBody>
+          <a:bodyPr/>
+          <a:lstStyle/>
+          <a:p>
+            <a:pPr marL="0" indent="0">
+              <a:buNone/>
+            </a:pPr>
+            <a:endParaRPr lang="en-US" dirty="0"/>
+          </a:p>
+        </p:txBody>
+      </p:sp>
+    </p:spTree>
+    <p:extLst>
+      <p:ext uri="{BB962C8B-B14F-4D97-AF65-F5344CB8AC3E}">
+        <p14:creationId xmlns:p14="http://schemas.microsoft.com/office/powerpoint/2010/main" val="2366017682"/>
+      </p:ext>
+    </p:extLst>
+  </p:cSld>
+  <p:clrMapOvr>
+    <a:masterClrMapping/>
+  </p:clrMapOvr>
+</p:sld>
+</file>
+
+<file path=ppt/slides/slide18.xml><?xml version="1.0" encoding="utf-8"?>
+<p:sld xmlns:a="http://schemas.openxmlformats.org/drawingml/2006/main" xmlns:r="http://schemas.openxmlformats.org/officeDocument/2006/relationships" xmlns:p="http://schemas.openxmlformats.org/presentationml/2006/main">
+  <p:cSld>
+    <p:spTree>
+      <p:nvGrpSpPr>
+        <p:cNvPr id="1" name=""/>
+        <p:cNvGrpSpPr/>
+        <p:nvPr/>
+      </p:nvGrpSpPr>
+      <p:grpSpPr>
+        <a:xfrm>
+          <a:off x="0" y="0"/>
+          <a:ext cx="0" cy="0"/>
+          <a:chOff x="0" y="0"/>
+          <a:chExt cx="0" cy="0"/>
+        </a:xfrm>
+      </p:grpSpPr>
+      <p:sp>
+        <p:nvSpPr>
+          <p:cNvPr id="2" name="Title 1">
+            <a:extLst>
+              <a:ext uri="{FF2B5EF4-FFF2-40B4-BE49-F238E27FC236}">
+                <a16:creationId xmlns:a16="http://schemas.microsoft.com/office/drawing/2014/main" id="{2B44A735-BD2C-97B7-B416-FD9057F806EE}"/>
+              </a:ext>
+            </a:extLst>
+          </p:cNvPr>
+          <p:cNvSpPr>
+            <a:spLocks noGrp="1"/>
+          </p:cNvSpPr>
+          <p:nvPr>
+            <p:ph type="title"/>
+          </p:nvPr>
+        </p:nvSpPr>
+        <p:spPr/>
+        <p:txBody>
+          <a:bodyPr/>
+          <a:lstStyle/>
+          <a:p>
+            <a:r>
+              <a:rPr lang="en-US" dirty="0"/>
+              <a:t>Artes: </a:t>
+            </a:r>
+            <a:r>
+              <a:rPr lang="en-US" dirty="0" err="1"/>
+              <a:t>Obstáculos</a:t>
+            </a:r>
+            <a:endParaRPr lang="en-US" dirty="0"/>
+          </a:p>
+        </p:txBody>
+      </p:sp>
+      <p:sp>
+        <p:nvSpPr>
+          <p:cNvPr id="3" name="Content Placeholder 2">
+            <a:extLst>
+              <a:ext uri="{FF2B5EF4-FFF2-40B4-BE49-F238E27FC236}">
+                <a16:creationId xmlns:a16="http://schemas.microsoft.com/office/drawing/2014/main" id="{0153D864-4EBA-06EF-D6BE-B3BA4898D745}"/>
+              </a:ext>
+            </a:extLst>
+          </p:cNvPr>
+          <p:cNvSpPr>
+            <a:spLocks noGrp="1"/>
+          </p:cNvSpPr>
+          <p:nvPr>
+            <p:ph idx="1"/>
+          </p:nvPr>
+        </p:nvSpPr>
+        <p:spPr/>
+        <p:txBody>
+          <a:bodyPr/>
+          <a:lstStyle/>
+          <a:p>
+            <a:pPr marL="0" indent="0">
+              <a:buNone/>
+            </a:pPr>
+            <a:endParaRPr lang="en-US" dirty="0"/>
+          </a:p>
+        </p:txBody>
+      </p:sp>
+    </p:spTree>
+    <p:extLst>
+      <p:ext uri="{BB962C8B-B14F-4D97-AF65-F5344CB8AC3E}">
+        <p14:creationId xmlns:p14="http://schemas.microsoft.com/office/powerpoint/2010/main" val="4020125093"/>
+      </p:ext>
+    </p:extLst>
+  </p:cSld>
+  <p:clrMapOvr>
+    <a:masterClrMapping/>
+  </p:clrMapOvr>
+</p:sld>
+</file>
+
+<file path=ppt/slides/slide19.xml><?xml version="1.0" encoding="utf-8"?>
+<p:sld xmlns:a="http://schemas.openxmlformats.org/drawingml/2006/main" xmlns:r="http://schemas.openxmlformats.org/officeDocument/2006/relationships" xmlns:p="http://schemas.openxmlformats.org/presentationml/2006/main">
+  <p:cSld>
+    <p:spTree>
+      <p:nvGrpSpPr>
+        <p:cNvPr id="1" name=""/>
+        <p:cNvGrpSpPr/>
+        <p:nvPr/>
+      </p:nvGrpSpPr>
+      <p:grpSpPr>
+        <a:xfrm>
+          <a:off x="0" y="0"/>
+          <a:ext cx="0" cy="0"/>
+          <a:chOff x="0" y="0"/>
+          <a:chExt cx="0" cy="0"/>
+        </a:xfrm>
+      </p:grpSpPr>
+      <p:sp>
+        <p:nvSpPr>
+          <p:cNvPr id="2" name="Title 1">
+            <a:extLst>
+              <a:ext uri="{FF2B5EF4-FFF2-40B4-BE49-F238E27FC236}">
+                <a16:creationId xmlns:a16="http://schemas.microsoft.com/office/drawing/2014/main" id="{2B44A735-BD2C-97B7-B416-FD9057F806EE}"/>
+              </a:ext>
+            </a:extLst>
+          </p:cNvPr>
+          <p:cNvSpPr>
+            <a:spLocks noGrp="1"/>
+          </p:cNvSpPr>
+          <p:nvPr>
+            <p:ph type="title"/>
+          </p:nvPr>
+        </p:nvSpPr>
+        <p:spPr/>
+        <p:txBody>
+          <a:bodyPr/>
+          <a:lstStyle/>
+          <a:p>
+            <a:r>
+              <a:rPr lang="en-US" dirty="0"/>
+              <a:t>Artes: Level Design</a:t>
+            </a:r>
+          </a:p>
+        </p:txBody>
+      </p:sp>
+      <p:sp>
+        <p:nvSpPr>
+          <p:cNvPr id="3" name="Content Placeholder 2">
+            <a:extLst>
+              <a:ext uri="{FF2B5EF4-FFF2-40B4-BE49-F238E27FC236}">
+                <a16:creationId xmlns:a16="http://schemas.microsoft.com/office/drawing/2014/main" id="{0153D864-4EBA-06EF-D6BE-B3BA4898D745}"/>
+              </a:ext>
+            </a:extLst>
+          </p:cNvPr>
+          <p:cNvSpPr>
+            <a:spLocks noGrp="1"/>
+          </p:cNvSpPr>
+          <p:nvPr>
+            <p:ph idx="1"/>
+          </p:nvPr>
+        </p:nvSpPr>
+        <p:spPr/>
+        <p:txBody>
+          <a:bodyPr/>
+          <a:lstStyle/>
+          <a:p>
+            <a:pPr marL="0" indent="0">
+              <a:buNone/>
+            </a:pPr>
+            <a:endParaRPr lang="en-US" dirty="0"/>
+          </a:p>
+        </p:txBody>
+      </p:sp>
+    </p:spTree>
+    <p:extLst>
+      <p:ext uri="{BB962C8B-B14F-4D97-AF65-F5344CB8AC3E}">
+        <p14:creationId xmlns:p14="http://schemas.microsoft.com/office/powerpoint/2010/main" val="1105844290"/>
+      </p:ext>
+    </p:extLst>
+  </p:cSld>
+  <p:clrMapOvr>
+    <a:masterClrMapping/>
+  </p:clrMapOvr>
+</p:sld>
+</file>
+
+<file path=ppt/slides/slide2.xml><?xml version="1.0" encoding="utf-8"?>
+<p:sld xmlns:a="http://schemas.openxmlformats.org/drawingml/2006/main" xmlns:r="http://schemas.openxmlformats.org/officeDocument/2006/relationships" xmlns:p="http://schemas.openxmlformats.org/presentationml/2006/main">
+  <p:cSld>
+    <p:spTree>
+      <p:nvGrpSpPr>
+        <p:cNvPr id="1" name=""/>
+        <p:cNvGrpSpPr/>
+        <p:nvPr/>
+      </p:nvGrpSpPr>
+      <p:grpSpPr>
+        <a:xfrm>
+          <a:off x="0" y="0"/>
+          <a:ext cx="0" cy="0"/>
+          <a:chOff x="0" y="0"/>
+          <a:chExt cx="0" cy="0"/>
+        </a:xfrm>
+      </p:grpSpPr>
+      <p:sp>
+        <p:nvSpPr>
+          <p:cNvPr id="2" name="Title 1">
+            <a:extLst>
+              <a:ext uri="{FF2B5EF4-FFF2-40B4-BE49-F238E27FC236}">
+                <a16:creationId xmlns:a16="http://schemas.microsoft.com/office/drawing/2014/main" id="{2B44A735-BD2C-97B7-B416-FD9057F806EE}"/>
+              </a:ext>
+            </a:extLst>
+          </p:cNvPr>
+          <p:cNvSpPr>
+            <a:spLocks noGrp="1"/>
+          </p:cNvSpPr>
+          <p:nvPr>
+            <p:ph type="title"/>
+          </p:nvPr>
+        </p:nvSpPr>
+        <p:spPr/>
+        <p:txBody>
+          <a:bodyPr/>
+          <a:lstStyle/>
+          <a:p>
+            <a:r>
+              <a:rPr lang="en-US" dirty="0"/>
+              <a:t>High Concept</a:t>
+            </a:r>
+          </a:p>
+        </p:txBody>
+      </p:sp>
+      <p:sp>
+        <p:nvSpPr>
+          <p:cNvPr id="3" name="Content Placeholder 2">
+            <a:extLst>
+              <a:ext uri="{FF2B5EF4-FFF2-40B4-BE49-F238E27FC236}">
+                <a16:creationId xmlns:a16="http://schemas.microsoft.com/office/drawing/2014/main" id="{0153D864-4EBA-06EF-D6BE-B3BA4898D745}"/>
+              </a:ext>
+            </a:extLst>
+          </p:cNvPr>
+          <p:cNvSpPr>
+            <a:spLocks noGrp="1"/>
+          </p:cNvSpPr>
+          <p:nvPr>
+            <p:ph idx="1"/>
+          </p:nvPr>
+        </p:nvSpPr>
+        <p:spPr/>
+        <p:txBody>
+          <a:bodyPr/>
+          <a:lstStyle/>
+          <a:p>
+            <a:pPr marL="0" indent="0">
+              <a:buNone/>
+            </a:pPr>
+            <a:r>
+              <a:rPr lang="en-US" dirty="0" err="1"/>
+              <a:t>Os</a:t>
+            </a:r>
+            <a:r>
+              <a:rPr lang="en-US" dirty="0"/>
+              <a:t> pets do bairro do </a:t>
+            </a:r>
+            <a:r>
+              <a:rPr lang="en-US" dirty="0" err="1"/>
+              <a:t>limoeiro</a:t>
+            </a:r>
+            <a:r>
+              <a:rPr lang="en-US" dirty="0"/>
+              <a:t> </a:t>
+            </a:r>
+            <a:r>
+              <a:rPr lang="en-US" dirty="0" err="1"/>
+              <a:t>fugiram</a:t>
+            </a:r>
+            <a:r>
+              <a:rPr lang="en-US" dirty="0"/>
+              <a:t> e cabe à </a:t>
+            </a:r>
+            <a:r>
+              <a:rPr lang="en-US" dirty="0" err="1"/>
+              <a:t>turminha</a:t>
+            </a:r>
+            <a:r>
+              <a:rPr lang="en-US" dirty="0"/>
+              <a:t> </a:t>
+            </a:r>
+            <a:r>
+              <a:rPr lang="en-US" dirty="0" err="1"/>
+              <a:t>reencontra-los</a:t>
+            </a:r>
+            <a:r>
+              <a:rPr lang="en-US" dirty="0"/>
+              <a:t>.</a:t>
+            </a:r>
+          </a:p>
+        </p:txBody>
+      </p:sp>
+    </p:spTree>
+    <p:extLst>
+      <p:ext uri="{BB962C8B-B14F-4D97-AF65-F5344CB8AC3E}">
+        <p14:creationId xmlns:p14="http://schemas.microsoft.com/office/powerpoint/2010/main" val="31761051"/>
+      </p:ext>
+    </p:extLst>
+  </p:cSld>
+  <p:clrMapOvr>
+    <a:masterClrMapping/>
+  </p:clrMapOvr>
+</p:sld>
+</file>
+
+<file path=ppt/slides/slide20.xml><?xml version="1.0" encoding="utf-8"?>
+<p:sld xmlns:a="http://schemas.openxmlformats.org/drawingml/2006/main" xmlns:r="http://schemas.openxmlformats.org/officeDocument/2006/relationships" xmlns:p="http://schemas.openxmlformats.org/presentationml/2006/main">
+  <p:cSld>
+    <p:spTree>
+      <p:nvGrpSpPr>
+        <p:cNvPr id="1" name=""/>
+        <p:cNvGrpSpPr/>
+        <p:nvPr/>
+      </p:nvGrpSpPr>
+      <p:grpSpPr>
+        <a:xfrm>
+          <a:off x="0" y="0"/>
+          <a:ext cx="0" cy="0"/>
+          <a:chOff x="0" y="0"/>
+          <a:chExt cx="0" cy="0"/>
+        </a:xfrm>
+      </p:grpSpPr>
+      <p:sp>
+        <p:nvSpPr>
+          <p:cNvPr id="2" name="Title 1">
+            <a:extLst>
+              <a:ext uri="{FF2B5EF4-FFF2-40B4-BE49-F238E27FC236}">
+                <a16:creationId xmlns:a16="http://schemas.microsoft.com/office/drawing/2014/main" id="{2B44A735-BD2C-97B7-B416-FD9057F806EE}"/>
+              </a:ext>
+            </a:extLst>
+          </p:cNvPr>
+          <p:cNvSpPr>
+            <a:spLocks noGrp="1"/>
+          </p:cNvSpPr>
+          <p:nvPr>
+            <p:ph type="title"/>
+          </p:nvPr>
+        </p:nvSpPr>
+        <p:spPr/>
+        <p:txBody>
+          <a:bodyPr/>
+          <a:lstStyle/>
+          <a:p>
+            <a:r>
+              <a:rPr lang="en-US" dirty="0"/>
+              <a:t>Obrigado</a:t>
+            </a:r>
+          </a:p>
+        </p:txBody>
+      </p:sp>
+      <p:sp>
+        <p:nvSpPr>
+          <p:cNvPr id="3" name="Content Placeholder 2">
+            <a:extLst>
+              <a:ext uri="{FF2B5EF4-FFF2-40B4-BE49-F238E27FC236}">
+                <a16:creationId xmlns:a16="http://schemas.microsoft.com/office/drawing/2014/main" id="{0153D864-4EBA-06EF-D6BE-B3BA4898D745}"/>
+              </a:ext>
+            </a:extLst>
+          </p:cNvPr>
+          <p:cNvSpPr>
+            <a:spLocks noGrp="1"/>
+          </p:cNvSpPr>
+          <p:nvPr>
+            <p:ph idx="1"/>
+          </p:nvPr>
+        </p:nvSpPr>
+        <p:spPr/>
+        <p:txBody>
+          <a:bodyPr/>
+          <a:lstStyle/>
+          <a:p>
+            <a:pPr marL="0" indent="0">
+              <a:buNone/>
+            </a:pPr>
+            <a:endParaRPr lang="en-US" dirty="0"/>
+          </a:p>
+        </p:txBody>
+      </p:sp>
+    </p:spTree>
+    <p:extLst>
+      <p:ext uri="{BB962C8B-B14F-4D97-AF65-F5344CB8AC3E}">
+        <p14:creationId xmlns:p14="http://schemas.microsoft.com/office/powerpoint/2010/main" val="1098726033"/>
+      </p:ext>
+    </p:extLst>
+  </p:cSld>
+  <p:clrMapOvr>
+    <a:masterClrMapping/>
+  </p:clrMapOvr>
+</p:sld>
+</file>
+
+<file path=ppt/slides/slide3.xml><?xml version="1.0" encoding="utf-8"?>
+<p:sld xmlns:a="http://schemas.openxmlformats.org/drawingml/2006/main" xmlns:r="http://schemas.openxmlformats.org/officeDocument/2006/relationships" xmlns:p="http://schemas.openxmlformats.org/presentationml/2006/main">
+  <p:cSld>
+    <p:spTree>
+      <p:nvGrpSpPr>
+        <p:cNvPr id="1" name=""/>
+        <p:cNvGrpSpPr/>
+        <p:nvPr/>
+      </p:nvGrpSpPr>
+      <p:grpSpPr>
+        <a:xfrm>
+          <a:off x="0" y="0"/>
+          <a:ext cx="0" cy="0"/>
+          <a:chOff x="0" y="0"/>
+          <a:chExt cx="0" cy="0"/>
+        </a:xfrm>
+      </p:grpSpPr>
+      <p:sp>
+        <p:nvSpPr>
+          <p:cNvPr id="2" name="Title 1">
+            <a:extLst>
+              <a:ext uri="{FF2B5EF4-FFF2-40B4-BE49-F238E27FC236}">
+                <a16:creationId xmlns:a16="http://schemas.microsoft.com/office/drawing/2014/main" id="{2B44A735-BD2C-97B7-B416-FD9057F806EE}"/>
+              </a:ext>
+            </a:extLst>
+          </p:cNvPr>
+          <p:cNvSpPr>
+            <a:spLocks noGrp="1"/>
+          </p:cNvSpPr>
+          <p:nvPr>
+            <p:ph type="title"/>
+          </p:nvPr>
+        </p:nvSpPr>
+        <p:spPr/>
+        <p:txBody>
+          <a:bodyPr/>
+          <a:lstStyle/>
+          <a:p>
+            <a:r>
+              <a:rPr lang="en-US" dirty="0"/>
+              <a:t>Concept</a:t>
+            </a:r>
+          </a:p>
+        </p:txBody>
+      </p:sp>
+      <p:sp>
+        <p:nvSpPr>
+          <p:cNvPr id="3" name="Content Placeholder 2">
+            <a:extLst>
+              <a:ext uri="{FF2B5EF4-FFF2-40B4-BE49-F238E27FC236}">
+                <a16:creationId xmlns:a16="http://schemas.microsoft.com/office/drawing/2014/main" id="{0153D864-4EBA-06EF-D6BE-B3BA4898D745}"/>
+              </a:ext>
+            </a:extLst>
+          </p:cNvPr>
+          <p:cNvSpPr>
+            <a:spLocks noGrp="1"/>
+          </p:cNvSpPr>
+          <p:nvPr>
+            <p:ph idx="1"/>
+          </p:nvPr>
+        </p:nvSpPr>
+        <p:spPr/>
+        <p:txBody>
+          <a:bodyPr/>
+          <a:lstStyle/>
+          <a:p>
+            <a:pPr marL="0" indent="0">
+              <a:buNone/>
+            </a:pPr>
+            <a:r>
+              <a:rPr lang="en-US" dirty="0" err="1"/>
+              <a:t>Cada</a:t>
+            </a:r>
+            <a:r>
+              <a:rPr lang="en-US" dirty="0"/>
+              <a:t> </a:t>
+            </a:r>
+            <a:r>
+              <a:rPr lang="en-US" dirty="0" err="1"/>
+              <a:t>personagem</a:t>
+            </a:r>
+            <a:r>
+              <a:rPr lang="en-US" dirty="0"/>
+              <a:t> com </a:t>
+            </a:r>
+            <a:r>
+              <a:rPr lang="en-US" dirty="0" err="1"/>
+              <a:t>sua</a:t>
+            </a:r>
+            <a:r>
+              <a:rPr lang="en-US" dirty="0"/>
+              <a:t> </a:t>
+            </a:r>
+            <a:r>
+              <a:rPr lang="en-US" dirty="0" err="1"/>
+              <a:t>individualidade</a:t>
+            </a:r>
+            <a:r>
+              <a:rPr lang="en-US" dirty="0"/>
+              <a:t> deve </a:t>
+            </a:r>
+            <a:r>
+              <a:rPr lang="en-US" dirty="0" err="1"/>
+              <a:t>ajudar</a:t>
+            </a:r>
+            <a:r>
+              <a:rPr lang="en-US" dirty="0"/>
+              <a:t> </a:t>
+            </a:r>
+            <a:r>
+              <a:rPr lang="en-US" dirty="0" err="1"/>
+              <a:t>seus</a:t>
+            </a:r>
+            <a:r>
+              <a:rPr lang="en-US" dirty="0"/>
+              <a:t> amigos a </a:t>
+            </a:r>
+            <a:r>
+              <a:rPr lang="en-US" dirty="0" err="1"/>
+              <a:t>reencontrarem</a:t>
+            </a:r>
+            <a:r>
+              <a:rPr lang="en-US" dirty="0"/>
+              <a:t> </a:t>
+            </a:r>
+            <a:r>
+              <a:rPr lang="en-US" dirty="0" err="1"/>
+              <a:t>seus</a:t>
+            </a:r>
+            <a:r>
+              <a:rPr lang="en-US" dirty="0"/>
+              <a:t> pets, </a:t>
+            </a:r>
+            <a:r>
+              <a:rPr lang="en-US" dirty="0" err="1"/>
+              <a:t>descobrindo</a:t>
+            </a:r>
+            <a:r>
+              <a:rPr lang="en-US" dirty="0"/>
+              <a:t> </a:t>
+            </a:r>
+            <a:r>
+              <a:rPr lang="en-US" dirty="0" err="1"/>
+              <a:t>curiosidades</a:t>
+            </a:r>
+            <a:r>
+              <a:rPr lang="en-US" dirty="0"/>
+              <a:t> pelo </a:t>
+            </a:r>
+            <a:r>
+              <a:rPr lang="en-US" dirty="0" err="1"/>
+              <a:t>caminho</a:t>
+            </a:r>
+            <a:r>
+              <a:rPr lang="en-US" dirty="0"/>
+              <a:t>.</a:t>
+            </a:r>
+          </a:p>
+          <a:p>
+            <a:pPr marL="0" indent="0">
+              <a:buNone/>
+            </a:pPr>
+            <a:endParaRPr lang="en-US" dirty="0"/>
+          </a:p>
+          <a:p>
+            <a:r>
+              <a:rPr lang="en-US" dirty="0"/>
+              <a:t>2D Puzzle Platformer</a:t>
+            </a:r>
+          </a:p>
+          <a:p>
+            <a:r>
+              <a:rPr lang="en-US" dirty="0" err="1"/>
+              <a:t>Situado</a:t>
+            </a:r>
+            <a:r>
+              <a:rPr lang="en-US" dirty="0"/>
+              <a:t> no Bairro do </a:t>
+            </a:r>
+            <a:r>
+              <a:rPr lang="en-US" dirty="0" err="1"/>
+              <a:t>Limoeiro</a:t>
+            </a:r>
+            <a:endParaRPr lang="en-US" dirty="0"/>
+          </a:p>
+        </p:txBody>
+      </p:sp>
+    </p:spTree>
+    <p:extLst>
+      <p:ext uri="{BB962C8B-B14F-4D97-AF65-F5344CB8AC3E}">
+        <p14:creationId xmlns:p14="http://schemas.microsoft.com/office/powerpoint/2010/main" val="3984233241"/>
+      </p:ext>
+    </p:extLst>
+  </p:cSld>
+  <p:clrMapOvr>
+    <a:masterClrMapping/>
+  </p:clrMapOvr>
+</p:sld>
+</file>
+
+<file path=ppt/slides/slide4.xml><?xml version="1.0" encoding="utf-8"?>
+<p:sld xmlns:a="http://schemas.openxmlformats.org/drawingml/2006/main" xmlns:r="http://schemas.openxmlformats.org/officeDocument/2006/relationships" xmlns:p="http://schemas.openxmlformats.org/presentationml/2006/main">
+  <p:cSld>
+    <p:spTree>
+      <p:nvGrpSpPr>
+        <p:cNvPr id="1" name=""/>
+        <p:cNvGrpSpPr/>
+        <p:nvPr/>
+      </p:nvGrpSpPr>
+      <p:grpSpPr>
+        <a:xfrm>
+          <a:off x="0" y="0"/>
+          <a:ext cx="0" cy="0"/>
+          <a:chOff x="0" y="0"/>
+          <a:chExt cx="0" cy="0"/>
+        </a:xfrm>
+      </p:grpSpPr>
+      <p:sp>
+        <p:nvSpPr>
+          <p:cNvPr id="2" name="Title 1">
+            <a:extLst>
+              <a:ext uri="{FF2B5EF4-FFF2-40B4-BE49-F238E27FC236}">
+                <a16:creationId xmlns:a16="http://schemas.microsoft.com/office/drawing/2014/main" id="{3F79763B-D48C-E6CB-6688-0646E1CE1D93}"/>
+              </a:ext>
+            </a:extLst>
+          </p:cNvPr>
+          <p:cNvSpPr>
+            <a:spLocks noGrp="1"/>
+          </p:cNvSpPr>
+          <p:nvPr>
+            <p:ph type="title"/>
+          </p:nvPr>
+        </p:nvSpPr>
+        <p:spPr/>
+        <p:txBody>
+          <a:bodyPr/>
+          <a:lstStyle/>
+          <a:p>
+            <a:r>
+              <a:rPr lang="en-US" dirty="0" err="1"/>
+              <a:t>Mecânica</a:t>
+            </a:r>
+            <a:r>
+              <a:rPr lang="en-US" dirty="0"/>
+              <a:t> Principal</a:t>
+            </a:r>
+          </a:p>
+        </p:txBody>
+      </p:sp>
+      <p:sp>
+        <p:nvSpPr>
+          <p:cNvPr id="3" name="Content Placeholder 2">
+            <a:extLst>
+              <a:ext uri="{FF2B5EF4-FFF2-40B4-BE49-F238E27FC236}">
+                <a16:creationId xmlns:a16="http://schemas.microsoft.com/office/drawing/2014/main" id="{085470C4-D9C2-9569-2ED6-FF18D3EAD0B7}"/>
+              </a:ext>
+            </a:extLst>
+          </p:cNvPr>
+          <p:cNvSpPr>
+            <a:spLocks noGrp="1"/>
+          </p:cNvSpPr>
+          <p:nvPr>
+            <p:ph idx="1"/>
+          </p:nvPr>
+        </p:nvSpPr>
+        <p:spPr/>
+        <p:txBody>
+          <a:bodyPr/>
+          <a:lstStyle/>
+          <a:p>
+            <a:r>
+              <a:rPr lang="en-US" dirty="0" err="1"/>
+              <a:t>Troca</a:t>
+            </a:r>
+            <a:r>
+              <a:rPr lang="en-US" dirty="0"/>
+              <a:t> de </a:t>
+            </a:r>
+            <a:r>
+              <a:rPr lang="en-US" dirty="0" err="1"/>
+              <a:t>Personagens</a:t>
+            </a:r>
+            <a:endParaRPr lang="en-US" dirty="0"/>
+          </a:p>
+        </p:txBody>
+      </p:sp>
+    </p:spTree>
+    <p:extLst>
+      <p:ext uri="{BB962C8B-B14F-4D97-AF65-F5344CB8AC3E}">
+        <p14:creationId xmlns:p14="http://schemas.microsoft.com/office/powerpoint/2010/main" val="1580651906"/>
+      </p:ext>
+    </p:extLst>
+  </p:cSld>
+  <p:clrMapOvr>
+    <a:masterClrMapping/>
+  </p:clrMapOvr>
+</p:sld>
+</file>
+
+<file path=ppt/slides/slide5.xml><?xml version="1.0" encoding="utf-8"?>
+<p:sld xmlns:a="http://schemas.openxmlformats.org/drawingml/2006/main" xmlns:r="http://schemas.openxmlformats.org/officeDocument/2006/relationships" xmlns:p="http://schemas.openxmlformats.org/presentationml/2006/main">
+  <p:cSld>
+    <p:spTree>
+      <p:nvGrpSpPr>
+        <p:cNvPr id="1" name=""/>
+        <p:cNvGrpSpPr/>
+        <p:nvPr/>
+      </p:nvGrpSpPr>
+      <p:grpSpPr>
+        <a:xfrm>
+          <a:off x="0" y="0"/>
+          <a:ext cx="0" cy="0"/>
+          <a:chOff x="0" y="0"/>
+          <a:chExt cx="0" cy="0"/>
+        </a:xfrm>
+      </p:grpSpPr>
+      <p:sp>
+        <p:nvSpPr>
+          <p:cNvPr id="2" name="Title 1">
+            <a:extLst>
+              <a:ext uri="{FF2B5EF4-FFF2-40B4-BE49-F238E27FC236}">
+                <a16:creationId xmlns:a16="http://schemas.microsoft.com/office/drawing/2014/main" id="{91ADED5D-B329-2A00-4BD6-1DE8B222045C}"/>
+              </a:ext>
+            </a:extLst>
+          </p:cNvPr>
+          <p:cNvSpPr>
+            <a:spLocks noGrp="1"/>
+          </p:cNvSpPr>
+          <p:nvPr>
+            <p:ph type="title"/>
+          </p:nvPr>
+        </p:nvSpPr>
+        <p:spPr/>
+        <p:txBody>
+          <a:bodyPr/>
+          <a:lstStyle/>
+          <a:p>
+            <a:r>
+              <a:rPr lang="en-US" dirty="0" err="1"/>
+              <a:t>Mecânica</a:t>
+            </a:r>
+            <a:r>
+              <a:rPr lang="en-US" dirty="0"/>
+              <a:t> </a:t>
+            </a:r>
+            <a:r>
+              <a:rPr lang="en-US" dirty="0" err="1"/>
+              <a:t>Básica</a:t>
+            </a:r>
+            <a:r>
+              <a:rPr lang="en-US" dirty="0"/>
+              <a:t> - </a:t>
+            </a:r>
+            <a:r>
+              <a:rPr lang="en-US" dirty="0" err="1"/>
+              <a:t>Mônica</a:t>
+            </a:r>
+            <a:endParaRPr lang="en-US" dirty="0"/>
+          </a:p>
+        </p:txBody>
+      </p:sp>
+      <p:sp>
+        <p:nvSpPr>
+          <p:cNvPr id="3" name="Content Placeholder 2">
+            <a:extLst>
+              <a:ext uri="{FF2B5EF4-FFF2-40B4-BE49-F238E27FC236}">
+                <a16:creationId xmlns:a16="http://schemas.microsoft.com/office/drawing/2014/main" id="{532DA5D7-10BD-DEC7-9AFC-430800089859}"/>
+              </a:ext>
+            </a:extLst>
+          </p:cNvPr>
+          <p:cNvSpPr>
+            <a:spLocks noGrp="1"/>
+          </p:cNvSpPr>
+          <p:nvPr>
+            <p:ph idx="1"/>
+          </p:nvPr>
+        </p:nvSpPr>
+        <p:spPr/>
+        <p:txBody>
+          <a:bodyPr/>
+          <a:lstStyle/>
+          <a:p>
+            <a:pPr marL="0" indent="0">
+              <a:buNone/>
+            </a:pPr>
+            <a:r>
+              <a:rPr lang="en-US" dirty="0" err="1"/>
+              <a:t>Arremessar</a:t>
+            </a:r>
+            <a:r>
+              <a:rPr lang="en-US" dirty="0"/>
+              <a:t> </a:t>
+            </a:r>
+            <a:r>
+              <a:rPr lang="en-US" dirty="0" err="1"/>
+              <a:t>Sansão</a:t>
+            </a:r>
+            <a:endParaRPr lang="en-US" dirty="0"/>
+          </a:p>
+        </p:txBody>
+      </p:sp>
+    </p:spTree>
+    <p:extLst>
+      <p:ext uri="{BB962C8B-B14F-4D97-AF65-F5344CB8AC3E}">
+        <p14:creationId xmlns:p14="http://schemas.microsoft.com/office/powerpoint/2010/main" val="3797838162"/>
+      </p:ext>
+    </p:extLst>
+  </p:cSld>
+  <p:clrMapOvr>
+    <a:masterClrMapping/>
+  </p:clrMapOvr>
+</p:sld>
+</file>
+
+<file path=ppt/slides/slide6.xml><?xml version="1.0" encoding="utf-8"?>
+<p:sld xmlns:a="http://schemas.openxmlformats.org/drawingml/2006/main" xmlns:r="http://schemas.openxmlformats.org/officeDocument/2006/relationships" xmlns:p="http://schemas.openxmlformats.org/presentationml/2006/main">
+  <p:cSld>
+    <p:spTree>
+      <p:nvGrpSpPr>
+        <p:cNvPr id="1" name=""/>
+        <p:cNvGrpSpPr/>
+        <p:nvPr/>
+      </p:nvGrpSpPr>
+      <p:grpSpPr>
+        <a:xfrm>
+          <a:off x="0" y="0"/>
+          <a:ext cx="0" cy="0"/>
+          <a:chOff x="0" y="0"/>
+          <a:chExt cx="0" cy="0"/>
+        </a:xfrm>
+      </p:grpSpPr>
+      <p:sp>
+        <p:nvSpPr>
+          <p:cNvPr id="2" name="Title 1">
+            <a:extLst>
+              <a:ext uri="{FF2B5EF4-FFF2-40B4-BE49-F238E27FC236}">
+                <a16:creationId xmlns:a16="http://schemas.microsoft.com/office/drawing/2014/main" id="{91ADED5D-B329-2A00-4BD6-1DE8B222045C}"/>
+              </a:ext>
+            </a:extLst>
+          </p:cNvPr>
+          <p:cNvSpPr>
+            <a:spLocks noGrp="1"/>
+          </p:cNvSpPr>
+          <p:nvPr>
+            <p:ph type="title"/>
+          </p:nvPr>
+        </p:nvSpPr>
+        <p:spPr/>
+        <p:txBody>
+          <a:bodyPr/>
+          <a:lstStyle/>
+          <a:p>
+            <a:r>
+              <a:rPr lang="en-US" dirty="0" err="1"/>
+              <a:t>Mecânica</a:t>
+            </a:r>
+            <a:r>
+              <a:rPr lang="en-US" dirty="0"/>
+              <a:t> </a:t>
+            </a:r>
+            <a:r>
+              <a:rPr lang="en-US" dirty="0" err="1"/>
+              <a:t>Básica</a:t>
+            </a:r>
+            <a:r>
+              <a:rPr lang="en-US" dirty="0"/>
+              <a:t> - </a:t>
+            </a:r>
+            <a:r>
+              <a:rPr lang="en-US" dirty="0" err="1"/>
+              <a:t>Cebolinha</a:t>
+            </a:r>
+            <a:endParaRPr lang="en-US" dirty="0"/>
+          </a:p>
+        </p:txBody>
+      </p:sp>
+      <p:sp>
+        <p:nvSpPr>
+          <p:cNvPr id="3" name="Content Placeholder 2">
+            <a:extLst>
+              <a:ext uri="{FF2B5EF4-FFF2-40B4-BE49-F238E27FC236}">
+                <a16:creationId xmlns:a16="http://schemas.microsoft.com/office/drawing/2014/main" id="{532DA5D7-10BD-DEC7-9AFC-430800089859}"/>
+              </a:ext>
+            </a:extLst>
+          </p:cNvPr>
+          <p:cNvSpPr>
+            <a:spLocks noGrp="1"/>
+          </p:cNvSpPr>
+          <p:nvPr>
+            <p:ph idx="1"/>
+          </p:nvPr>
+        </p:nvSpPr>
+        <p:spPr/>
+        <p:txBody>
+          <a:bodyPr/>
+          <a:lstStyle/>
+          <a:p>
+            <a:pPr marL="0" indent="0">
+              <a:buNone/>
+            </a:pPr>
+            <a:r>
+              <a:rPr lang="en-US" dirty="0" err="1"/>
+              <a:t>Levitar</a:t>
+            </a:r>
+            <a:r>
+              <a:rPr lang="en-US" dirty="0"/>
+              <a:t> </a:t>
+            </a:r>
+            <a:r>
+              <a:rPr lang="en-US" dirty="0" err="1"/>
+              <a:t>por</a:t>
+            </a:r>
+            <a:r>
+              <a:rPr lang="en-US" dirty="0"/>
+              <a:t> meio do seu </a:t>
+            </a:r>
+            <a:r>
+              <a:rPr lang="en-US" dirty="0" err="1"/>
+              <a:t>cabelo</a:t>
+            </a:r>
+            <a:endParaRPr lang="en-US" dirty="0"/>
+          </a:p>
+        </p:txBody>
+      </p:sp>
+    </p:spTree>
+    <p:extLst>
+      <p:ext uri="{BB962C8B-B14F-4D97-AF65-F5344CB8AC3E}">
+        <p14:creationId xmlns:p14="http://schemas.microsoft.com/office/powerpoint/2010/main" val="3068506950"/>
+      </p:ext>
+    </p:extLst>
+  </p:cSld>
+  <p:clrMapOvr>
+    <a:masterClrMapping/>
+  </p:clrMapOvr>
+</p:sld>
+</file>
+
+<file path=ppt/slides/slide7.xml><?xml version="1.0" encoding="utf-8"?>
+<p:sld xmlns:a="http://schemas.openxmlformats.org/drawingml/2006/main" xmlns:r="http://schemas.openxmlformats.org/officeDocument/2006/relationships" xmlns:p="http://schemas.openxmlformats.org/presentationml/2006/main">
+  <p:cSld>
+    <p:spTree>
+      <p:nvGrpSpPr>
+        <p:cNvPr id="1" name=""/>
+        <p:cNvGrpSpPr/>
+        <p:nvPr/>
+      </p:nvGrpSpPr>
+      <p:grpSpPr>
+        <a:xfrm>
+          <a:off x="0" y="0"/>
+          <a:ext cx="0" cy="0"/>
+          <a:chOff x="0" y="0"/>
+          <a:chExt cx="0" cy="0"/>
+        </a:xfrm>
+      </p:grpSpPr>
+      <p:sp>
+        <p:nvSpPr>
+          <p:cNvPr id="2" name="Title 1">
+            <a:extLst>
+              <a:ext uri="{FF2B5EF4-FFF2-40B4-BE49-F238E27FC236}">
+                <a16:creationId xmlns:a16="http://schemas.microsoft.com/office/drawing/2014/main" id="{91ADED5D-B329-2A00-4BD6-1DE8B222045C}"/>
+              </a:ext>
+            </a:extLst>
+          </p:cNvPr>
+          <p:cNvSpPr>
+            <a:spLocks noGrp="1"/>
+          </p:cNvSpPr>
+          <p:nvPr>
+            <p:ph type="title"/>
+          </p:nvPr>
+        </p:nvSpPr>
+        <p:spPr/>
+        <p:txBody>
+          <a:bodyPr/>
+          <a:lstStyle/>
+          <a:p>
+            <a:r>
+              <a:rPr lang="en-US" dirty="0" err="1"/>
+              <a:t>Mecânica</a:t>
+            </a:r>
+            <a:r>
+              <a:rPr lang="en-US" dirty="0"/>
+              <a:t> </a:t>
+            </a:r>
+            <a:r>
+              <a:rPr lang="en-US" dirty="0" err="1"/>
+              <a:t>Básica</a:t>
+            </a:r>
+            <a:r>
+              <a:rPr lang="en-US" dirty="0"/>
+              <a:t> - </a:t>
+            </a:r>
+            <a:r>
+              <a:rPr lang="en-US" dirty="0" err="1"/>
+              <a:t>Cascão</a:t>
+            </a:r>
+            <a:endParaRPr lang="en-US" dirty="0"/>
+          </a:p>
+        </p:txBody>
+      </p:sp>
+      <p:sp>
+        <p:nvSpPr>
+          <p:cNvPr id="3" name="Content Placeholder 2">
+            <a:extLst>
+              <a:ext uri="{FF2B5EF4-FFF2-40B4-BE49-F238E27FC236}">
+                <a16:creationId xmlns:a16="http://schemas.microsoft.com/office/drawing/2014/main" id="{532DA5D7-10BD-DEC7-9AFC-430800089859}"/>
+              </a:ext>
+            </a:extLst>
+          </p:cNvPr>
+          <p:cNvSpPr>
+            <a:spLocks noGrp="1"/>
+          </p:cNvSpPr>
+          <p:nvPr>
+            <p:ph idx="1"/>
+          </p:nvPr>
+        </p:nvSpPr>
+        <p:spPr/>
+        <p:txBody>
+          <a:bodyPr/>
+          <a:lstStyle/>
+          <a:p>
+            <a:pPr marL="0" indent="0">
+              <a:buNone/>
+            </a:pPr>
+            <a:r>
+              <a:rPr lang="en-US" dirty="0"/>
+              <a:t>Planar com seu </a:t>
+            </a:r>
+            <a:r>
+              <a:rPr lang="en-US" dirty="0" err="1"/>
+              <a:t>guarda</a:t>
+            </a:r>
+            <a:r>
+              <a:rPr lang="en-US" dirty="0"/>
+              <a:t>-chuva</a:t>
+            </a:r>
+          </a:p>
+        </p:txBody>
+      </p:sp>
+    </p:spTree>
+    <p:extLst>
+      <p:ext uri="{BB962C8B-B14F-4D97-AF65-F5344CB8AC3E}">
+        <p14:creationId xmlns:p14="http://schemas.microsoft.com/office/powerpoint/2010/main" val="3667708840"/>
+      </p:ext>
+    </p:extLst>
+  </p:cSld>
+  <p:clrMapOvr>
+    <a:masterClrMapping/>
+  </p:clrMapOvr>
+</p:sld>
+</file>
+
+<file path=ppt/slides/slide8.xml><?xml version="1.0" encoding="utf-8"?>
+<p:sld xmlns:a="http://schemas.openxmlformats.org/drawingml/2006/main" xmlns:r="http://schemas.openxmlformats.org/officeDocument/2006/relationships" xmlns:p="http://schemas.openxmlformats.org/presentationml/2006/main">
+  <p:cSld>
+    <p:spTree>
+      <p:nvGrpSpPr>
+        <p:cNvPr id="1" name=""/>
+        <p:cNvGrpSpPr/>
+        <p:nvPr/>
+      </p:nvGrpSpPr>
+      <p:grpSpPr>
+        <a:xfrm>
+          <a:off x="0" y="0"/>
+          <a:ext cx="0" cy="0"/>
+          <a:chOff x="0" y="0"/>
+          <a:chExt cx="0" cy="0"/>
+        </a:xfrm>
+      </p:grpSpPr>
+      <p:sp>
+        <p:nvSpPr>
+          <p:cNvPr id="2" name="Title 1">
+            <a:extLst>
+              <a:ext uri="{FF2B5EF4-FFF2-40B4-BE49-F238E27FC236}">
+                <a16:creationId xmlns:a16="http://schemas.microsoft.com/office/drawing/2014/main" id="{91ADED5D-B329-2A00-4BD6-1DE8B222045C}"/>
+              </a:ext>
+            </a:extLst>
+          </p:cNvPr>
+          <p:cNvSpPr>
+            <a:spLocks noGrp="1"/>
+          </p:cNvSpPr>
+          <p:nvPr>
+            <p:ph type="title"/>
+          </p:nvPr>
+        </p:nvSpPr>
+        <p:spPr/>
+        <p:txBody>
+          <a:bodyPr/>
+          <a:lstStyle/>
+          <a:p>
+            <a:r>
+              <a:rPr lang="en-US" dirty="0" err="1"/>
+              <a:t>Mecânica</a:t>
+            </a:r>
+            <a:r>
+              <a:rPr lang="en-US" dirty="0"/>
+              <a:t> </a:t>
+            </a:r>
+            <a:r>
+              <a:rPr lang="en-US" dirty="0" err="1"/>
+              <a:t>Básica</a:t>
+            </a:r>
+            <a:r>
+              <a:rPr lang="en-US" dirty="0"/>
+              <a:t> - Magali</a:t>
+            </a:r>
+          </a:p>
+        </p:txBody>
+      </p:sp>
+      <p:sp>
+        <p:nvSpPr>
+          <p:cNvPr id="3" name="Content Placeholder 2">
+            <a:extLst>
+              <a:ext uri="{FF2B5EF4-FFF2-40B4-BE49-F238E27FC236}">
+                <a16:creationId xmlns:a16="http://schemas.microsoft.com/office/drawing/2014/main" id="{532DA5D7-10BD-DEC7-9AFC-430800089859}"/>
+              </a:ext>
+            </a:extLst>
+          </p:cNvPr>
+          <p:cNvSpPr>
+            <a:spLocks noGrp="1"/>
+          </p:cNvSpPr>
+          <p:nvPr>
+            <p:ph idx="1"/>
+          </p:nvPr>
+        </p:nvSpPr>
+        <p:spPr/>
+        <p:txBody>
+          <a:bodyPr/>
+          <a:lstStyle/>
+          <a:p>
+            <a:pPr marL="0" indent="0">
+              <a:buNone/>
+            </a:pPr>
+            <a:r>
+              <a:rPr lang="en-US" dirty="0" err="1"/>
+              <a:t>Rolar</a:t>
+            </a:r>
+            <a:r>
+              <a:rPr lang="en-US" dirty="0"/>
+              <a:t> </a:t>
+            </a:r>
+            <a:r>
+              <a:rPr lang="en-US" dirty="0" err="1"/>
+              <a:t>melancia</a:t>
+            </a:r>
+            <a:endParaRPr lang="en-US" dirty="0"/>
+          </a:p>
+        </p:txBody>
+      </p:sp>
+    </p:spTree>
+    <p:extLst>
+      <p:ext uri="{BB962C8B-B14F-4D97-AF65-F5344CB8AC3E}">
+        <p14:creationId xmlns:p14="http://schemas.microsoft.com/office/powerpoint/2010/main" val="3130985285"/>
+      </p:ext>
+    </p:extLst>
+  </p:cSld>
+  <p:clrMapOvr>
+    <a:masterClrMapping/>
+  </p:clrMapOvr>
+</p:sld>
+</file>
+
+<file path=ppt/slides/slide9.xml><?xml version="1.0" encoding="utf-8"?>
+<p:sld xmlns:a="http://schemas.openxmlformats.org/drawingml/2006/main" xmlns:r="http://schemas.openxmlformats.org/officeDocument/2006/relationships" xmlns:p="http://schemas.openxmlformats.org/presentationml/2006/main">
+  <p:cSld>
+    <p:spTree>
+      <p:nvGrpSpPr>
+        <p:cNvPr id="1" name=""/>
+        <p:cNvGrpSpPr/>
+        <p:nvPr/>
+      </p:nvGrpSpPr>
+      <p:grpSpPr>
+        <a:xfrm>
+          <a:off x="0" y="0"/>
+          <a:ext cx="0" cy="0"/>
+          <a:chOff x="0" y="0"/>
+          <a:chExt cx="0" cy="0"/>
+        </a:xfrm>
+      </p:grpSpPr>
+      <p:sp>
+        <p:nvSpPr>
+          <p:cNvPr id="2" name="Title 1">
+            <a:extLst>
+              <a:ext uri="{FF2B5EF4-FFF2-40B4-BE49-F238E27FC236}">
+                <a16:creationId xmlns:a16="http://schemas.microsoft.com/office/drawing/2014/main" id="{91ADED5D-B329-2A00-4BD6-1DE8B222045C}"/>
+              </a:ext>
+            </a:extLst>
+          </p:cNvPr>
+          <p:cNvSpPr>
+            <a:spLocks noGrp="1"/>
+          </p:cNvSpPr>
+          <p:nvPr>
+            <p:ph type="title"/>
+          </p:nvPr>
+        </p:nvSpPr>
+        <p:spPr/>
+        <p:txBody>
+          <a:bodyPr/>
+          <a:lstStyle/>
+          <a:p>
+            <a:r>
+              <a:rPr lang="en-US" dirty="0" err="1"/>
+              <a:t>Mecânicas</a:t>
+            </a:r>
+            <a:r>
+              <a:rPr lang="en-US" dirty="0"/>
+              <a:t> </a:t>
+            </a:r>
+            <a:r>
+              <a:rPr lang="en-US" dirty="0" err="1"/>
+              <a:t>Secundárias</a:t>
+            </a:r>
+            <a:r>
+              <a:rPr lang="en-US" dirty="0"/>
+              <a:t> - </a:t>
+            </a:r>
+            <a:r>
+              <a:rPr lang="en-US" dirty="0" err="1"/>
+              <a:t>Mônica</a:t>
+            </a:r>
+            <a:endParaRPr lang="en-US" dirty="0"/>
+          </a:p>
+        </p:txBody>
+      </p:sp>
+      <p:sp>
+        <p:nvSpPr>
+          <p:cNvPr id="3" name="Content Placeholder 2">
+            <a:extLst>
+              <a:ext uri="{FF2B5EF4-FFF2-40B4-BE49-F238E27FC236}">
+                <a16:creationId xmlns:a16="http://schemas.microsoft.com/office/drawing/2014/main" id="{532DA5D7-10BD-DEC7-9AFC-430800089859}"/>
+              </a:ext>
+            </a:extLst>
+          </p:cNvPr>
+          <p:cNvSpPr>
+            <a:spLocks noGrp="1"/>
+          </p:cNvSpPr>
+          <p:nvPr>
+            <p:ph idx="1"/>
+          </p:nvPr>
+        </p:nvSpPr>
+        <p:spPr/>
+        <p:txBody>
+          <a:bodyPr/>
+          <a:lstStyle/>
+          <a:p>
+            <a:pPr marL="0" indent="0">
+              <a:buNone/>
+            </a:pPr>
+            <a:r>
+              <a:rPr lang="en-US" dirty="0" err="1"/>
+              <a:t>Coletar</a:t>
+            </a:r>
+            <a:r>
+              <a:rPr lang="en-US" dirty="0"/>
+              <a:t> </a:t>
+            </a:r>
+            <a:r>
+              <a:rPr lang="en-US" dirty="0" err="1"/>
+              <a:t>itens</a:t>
+            </a:r>
+            <a:r>
+              <a:rPr lang="en-US" dirty="0"/>
+              <a:t> </a:t>
+            </a:r>
+            <a:r>
+              <a:rPr lang="en-US" dirty="0" err="1"/>
+              <a:t>distantes</a:t>
+            </a:r>
+            <a:endParaRPr lang="en-US" dirty="0"/>
+          </a:p>
+          <a:p>
+            <a:pPr marL="0" indent="0">
+              <a:buNone/>
+            </a:pPr>
+            <a:r>
+              <a:rPr lang="en-US" dirty="0" err="1"/>
+              <a:t>Ativar</a:t>
+            </a:r>
+            <a:r>
+              <a:rPr lang="en-US" dirty="0"/>
+              <a:t> </a:t>
+            </a:r>
+            <a:r>
+              <a:rPr lang="en-US" dirty="0" err="1"/>
+              <a:t>alavancas</a:t>
+            </a:r>
+            <a:r>
+              <a:rPr lang="en-US" dirty="0"/>
+              <a:t> a </a:t>
+            </a:r>
+            <a:r>
+              <a:rPr lang="en-US" dirty="0" err="1"/>
+              <a:t>distância</a:t>
+            </a:r>
+            <a:endParaRPr lang="en-US" dirty="0"/>
+          </a:p>
+          <a:p>
+            <a:pPr marL="0" indent="0">
+              <a:buNone/>
+            </a:pPr>
+            <a:r>
+              <a:rPr lang="en-US" dirty="0" err="1"/>
+              <a:t>Derrubar</a:t>
+            </a:r>
+            <a:r>
+              <a:rPr lang="en-US" dirty="0"/>
+              <a:t> </a:t>
+            </a:r>
+            <a:r>
+              <a:rPr lang="en-US" dirty="0" err="1"/>
+              <a:t>obstáculos</a:t>
+            </a:r>
+            <a:r>
+              <a:rPr lang="en-US" dirty="0"/>
+              <a:t> à frente</a:t>
+            </a:r>
+          </a:p>
+        </p:txBody>
+      </p:sp>
+    </p:spTree>
+    <p:extLst>
+      <p:ext uri="{BB962C8B-B14F-4D97-AF65-F5344CB8AC3E}">
+        <p14:creationId xmlns:p14="http://schemas.microsoft.com/office/powerpoint/2010/main" val="2354457734"/>
+      </p:ext>
+    </p:extLst>
+  </p:cSld>
+  <p:clrMapOvr>
+    <a:masterClrMapping/>
+  </p:clrMapOvr>
+</p:sld>
+</file>
+
 <file path=ppt/theme/theme1.xml><?xml version="1.0" encoding="utf-8"?>
 <a:theme xmlns:a="http://schemas.openxmlformats.org/drawingml/2006/main" name="Office Theme">
   <a:themeElements>

</xml_diff>